<commit_message>
de bijna defenitieve versie van de robot
</commit_message>
<xml_diff>
--- a/school/afische.pptx
+++ b/school/afische.pptx
@@ -115,7 +115,7 @@
 <file path=ppt/revisionInfo.xml><?xml version="1.0" encoding="utf-8"?>
 <p1510:revInfo xmlns:a="http://schemas.openxmlformats.org/drawingml/2006/main" xmlns:r="http://schemas.openxmlformats.org/officeDocument/2006/relationships" xmlns:p1510="http://schemas.microsoft.com/office/powerpoint/2015/10/main">
   <p1510:revLst>
-    <p1510:client id="{5D434D30-F688-4623-B10D-9AE1AB3633DC}" v="26" dt="2025-03-10T09:06:35.361"/>
+    <p1510:client id="{5D434D30-F688-4623-B10D-9AE1AB3633DC}" v="36" dt="2025-03-10T12:18:11.878"/>
   </p1510:revLst>
 </p1510:revInfo>
 </file>
@@ -125,18 +125,18 @@
   <pc:docChgLst>
     <pc:chgData name="Debakker Stan" userId="dcaf6aa6-4ff3-4b00-8b67-253531728245" providerId="ADAL" clId="{5D434D30-F688-4623-B10D-9AE1AB3633DC}"/>
     <pc:docChg chg="undo custSel addSld modSld modMainMaster">
-      <pc:chgData name="Debakker Stan" userId="dcaf6aa6-4ff3-4b00-8b67-253531728245" providerId="ADAL" clId="{5D434D30-F688-4623-B10D-9AE1AB3633DC}" dt="2025-03-10T09:07:02.168" v="149" actId="167"/>
+      <pc:chgData name="Debakker Stan" userId="dcaf6aa6-4ff3-4b00-8b67-253531728245" providerId="ADAL" clId="{5D434D30-F688-4623-B10D-9AE1AB3633DC}" dt="2025-03-10T12:19:54.124" v="261" actId="1076"/>
       <pc:docMkLst>
         <pc:docMk/>
       </pc:docMkLst>
       <pc:sldChg chg="addSp delSp modSp new mod">
-        <pc:chgData name="Debakker Stan" userId="dcaf6aa6-4ff3-4b00-8b67-253531728245" providerId="ADAL" clId="{5D434D30-F688-4623-B10D-9AE1AB3633DC}" dt="2025-03-10T09:07:02.168" v="149" actId="167"/>
+        <pc:chgData name="Debakker Stan" userId="dcaf6aa6-4ff3-4b00-8b67-253531728245" providerId="ADAL" clId="{5D434D30-F688-4623-B10D-9AE1AB3633DC}" dt="2025-03-10T12:19:54.124" v="261" actId="1076"/>
         <pc:sldMkLst>
           <pc:docMk/>
           <pc:sldMk cId="428378912" sldId="256"/>
         </pc:sldMkLst>
         <pc:spChg chg="mod">
-          <ac:chgData name="Debakker Stan" userId="dcaf6aa6-4ff3-4b00-8b67-253531728245" providerId="ADAL" clId="{5D434D30-F688-4623-B10D-9AE1AB3633DC}" dt="2025-03-10T09:04:38.074" v="136" actId="14100"/>
+          <ac:chgData name="Debakker Stan" userId="dcaf6aa6-4ff3-4b00-8b67-253531728245" providerId="ADAL" clId="{5D434D30-F688-4623-B10D-9AE1AB3633DC}" dt="2025-03-10T12:19:48.374" v="259" actId="1076"/>
           <ac:spMkLst>
             <pc:docMk/>
             <pc:sldMk cId="428378912" sldId="256"/>
@@ -144,7 +144,7 @@
           </ac:spMkLst>
         </pc:spChg>
         <pc:spChg chg="mod">
-          <ac:chgData name="Debakker Stan" userId="dcaf6aa6-4ff3-4b00-8b67-253531728245" providerId="ADAL" clId="{5D434D30-F688-4623-B10D-9AE1AB3633DC}" dt="2025-03-10T09:04:20.247" v="133" actId="1076"/>
+          <ac:chgData name="Debakker Stan" userId="dcaf6aa6-4ff3-4b00-8b67-253531728245" providerId="ADAL" clId="{5D434D30-F688-4623-B10D-9AE1AB3633DC}" dt="2025-03-10T12:09:12.773" v="237" actId="1076"/>
           <ac:spMkLst>
             <pc:docMk/>
             <pc:sldMk cId="428378912" sldId="256"/>
@@ -159,16 +159,32 @@
             <ac:spMk id="7" creationId="{9A906033-5C90-070B-90E2-6828ACEB54D3}"/>
           </ac:spMkLst>
         </pc:spChg>
-        <pc:picChg chg="add mod">
-          <ac:chgData name="Debakker Stan" userId="dcaf6aa6-4ff3-4b00-8b67-253531728245" providerId="ADAL" clId="{5D434D30-F688-4623-B10D-9AE1AB3633DC}" dt="2025-03-10T09:03:39.969" v="127" actId="1076"/>
+        <pc:spChg chg="add del mod">
+          <ac:chgData name="Debakker Stan" userId="dcaf6aa6-4ff3-4b00-8b67-253531728245" providerId="ADAL" clId="{5D434D30-F688-4623-B10D-9AE1AB3633DC}" dt="2025-03-10T11:53:55.303" v="185" actId="478"/>
+          <ac:spMkLst>
+            <pc:docMk/>
+            <pc:sldMk cId="428378912" sldId="256"/>
+            <ac:spMk id="11" creationId="{685AD8D1-1318-B56B-8E60-E8F5E2147F27}"/>
+          </ac:spMkLst>
+        </pc:spChg>
+        <pc:graphicFrameChg chg="del mod">
+          <ac:chgData name="Debakker Stan" userId="dcaf6aa6-4ff3-4b00-8b67-253531728245" providerId="ADAL" clId="{5D434D30-F688-4623-B10D-9AE1AB3633DC}" dt="2025-03-10T11:40:30.100" v="151" actId="478"/>
+          <ac:graphicFrameMkLst>
+            <pc:docMk/>
+            <pc:sldMk cId="428378912" sldId="256"/>
+            <ac:graphicFrameMk id="5" creationId="{E245EC5F-39A8-0BB9-1AAB-9412AB06AFCA}"/>
+          </ac:graphicFrameMkLst>
+        </pc:graphicFrameChg>
+        <pc:picChg chg="add del mod">
+          <ac:chgData name="Debakker Stan" userId="dcaf6aa6-4ff3-4b00-8b67-253531728245" providerId="ADAL" clId="{5D434D30-F688-4623-B10D-9AE1AB3633DC}" dt="2025-03-10T11:41:04.205" v="157" actId="478"/>
           <ac:picMkLst>
             <pc:docMk/>
             <pc:sldMk cId="428378912" sldId="256"/>
             <ac:picMk id="4" creationId="{346F970F-7967-898E-5FB2-7A1EE8403452}"/>
           </ac:picMkLst>
         </pc:picChg>
-        <pc:picChg chg="add mod">
-          <ac:chgData name="Debakker Stan" userId="dcaf6aa6-4ff3-4b00-8b67-253531728245" providerId="ADAL" clId="{5D434D30-F688-4623-B10D-9AE1AB3633DC}" dt="2025-03-10T09:02:57.995" v="118" actId="1076"/>
+        <pc:picChg chg="add del mod">
+          <ac:chgData name="Debakker Stan" userId="dcaf6aa6-4ff3-4b00-8b67-253531728245" providerId="ADAL" clId="{5D434D30-F688-4623-B10D-9AE1AB3633DC}" dt="2025-03-10T11:50:30.332" v="161" actId="478"/>
           <ac:picMkLst>
             <pc:docMk/>
             <pc:sldMk cId="428378912" sldId="256"/>
@@ -183,12 +199,36 @@
             <ac:picMk id="8" creationId="{5CF9DBF4-7D69-2927-550E-0530C71F3C73}"/>
           </ac:picMkLst>
         </pc:picChg>
+        <pc:picChg chg="add mod">
+          <ac:chgData name="Debakker Stan" userId="dcaf6aa6-4ff3-4b00-8b67-253531728245" providerId="ADAL" clId="{5D434D30-F688-4623-B10D-9AE1AB3633DC}" dt="2025-03-10T12:19:54.124" v="261" actId="1076"/>
+          <ac:picMkLst>
+            <pc:docMk/>
+            <pc:sldMk cId="428378912" sldId="256"/>
+            <ac:picMk id="8" creationId="{C8413D58-BBC2-7428-4F98-0ABF47340AE4}"/>
+          </ac:picMkLst>
+        </pc:picChg>
+        <pc:picChg chg="add mod ord">
+          <ac:chgData name="Debakker Stan" userId="dcaf6aa6-4ff3-4b00-8b67-253531728245" providerId="ADAL" clId="{5D434D30-F688-4623-B10D-9AE1AB3633DC}" dt="2025-03-10T12:19:28.173" v="256" actId="14100"/>
+          <ac:picMkLst>
+            <pc:docMk/>
+            <pc:sldMk cId="428378912" sldId="256"/>
+            <ac:picMk id="9" creationId="{904C2A26-561A-97AD-7F4D-D6A65F47890B}"/>
+          </ac:picMkLst>
+        </pc:picChg>
         <pc:picChg chg="add del mod ord">
           <ac:chgData name="Debakker Stan" userId="dcaf6aa6-4ff3-4b00-8b67-253531728245" providerId="ADAL" clId="{5D434D30-F688-4623-B10D-9AE1AB3633DC}" dt="2025-03-10T09:05:19.322" v="137" actId="478"/>
           <ac:picMkLst>
             <pc:docMk/>
             <pc:sldMk cId="428378912" sldId="256"/>
             <ac:picMk id="10" creationId="{72983E33-8D90-2797-F022-85E096F10CF7}"/>
+          </ac:picMkLst>
+        </pc:picChg>
+        <pc:picChg chg="add del mod modCrop">
+          <ac:chgData name="Debakker Stan" userId="dcaf6aa6-4ff3-4b00-8b67-253531728245" providerId="ADAL" clId="{5D434D30-F688-4623-B10D-9AE1AB3633DC}" dt="2025-03-10T12:07:23.449" v="190" actId="478"/>
+          <ac:picMkLst>
+            <pc:docMk/>
+            <pc:sldMk cId="428378912" sldId="256"/>
+            <ac:picMk id="12" creationId="{0D3A54EF-BC8C-C48A-3315-42E1B3747713}"/>
           </ac:picMkLst>
         </pc:picChg>
         <pc:picChg chg="add del mod ord">
@@ -200,11 +240,27 @@
           </ac:picMkLst>
         </pc:picChg>
         <pc:picChg chg="add mod ord">
-          <ac:chgData name="Debakker Stan" userId="dcaf6aa6-4ff3-4b00-8b67-253531728245" providerId="ADAL" clId="{5D434D30-F688-4623-B10D-9AE1AB3633DC}" dt="2025-03-10T09:07:02.168" v="149" actId="167"/>
+          <ac:chgData name="Debakker Stan" userId="dcaf6aa6-4ff3-4b00-8b67-253531728245" providerId="ADAL" clId="{5D434D30-F688-4623-B10D-9AE1AB3633DC}" dt="2025-03-10T12:07:51.331" v="195" actId="167"/>
           <ac:picMkLst>
             <pc:docMk/>
             <pc:sldMk cId="428378912" sldId="256"/>
             <ac:picMk id="14" creationId="{9C05F23E-5C9A-36C9-50BC-571888BB4C5F}"/>
+          </ac:picMkLst>
+        </pc:picChg>
+        <pc:picChg chg="add mod">
+          <ac:chgData name="Debakker Stan" userId="dcaf6aa6-4ff3-4b00-8b67-253531728245" providerId="ADAL" clId="{5D434D30-F688-4623-B10D-9AE1AB3633DC}" dt="2025-03-10T12:19:34.165" v="257" actId="1076"/>
+          <ac:picMkLst>
+            <pc:docMk/>
+            <pc:sldMk cId="428378912" sldId="256"/>
+            <ac:picMk id="15" creationId="{71A4EB95-01AF-86B9-1C79-11BA5AFE9489}"/>
+          </ac:picMkLst>
+        </pc:picChg>
+        <pc:picChg chg="add mod">
+          <ac:chgData name="Debakker Stan" userId="dcaf6aa6-4ff3-4b00-8b67-253531728245" providerId="ADAL" clId="{5D434D30-F688-4623-B10D-9AE1AB3633DC}" dt="2025-03-10T12:19:39.233" v="258" actId="1076"/>
+          <ac:picMkLst>
+            <pc:docMk/>
+            <pc:sldMk cId="428378912" sldId="256"/>
+            <ac:picMk id="17" creationId="{97E0183B-8CC1-F6D8-C7D5-DCCD35E9387B}"/>
           </ac:picMkLst>
         </pc:picChg>
       </pc:sldChg>
@@ -3190,49 +3246,30 @@
       </p:pic>
       <p:pic>
         <p:nvPicPr>
-          <p:cNvPr id="4" name="Picture 4" descr="PTI West-Vlaanderen – Maak je wereld">
+          <p:cNvPr id="9" name="Picture 40">
             <a:extLst>
               <a:ext uri="{FF2B5EF4-FFF2-40B4-BE49-F238E27FC236}">
-                <a16:creationId xmlns:a16="http://schemas.microsoft.com/office/drawing/2014/main" id="{346F970F-7967-898E-5FB2-7A1EE8403452}"/>
+                <a16:creationId xmlns:a16="http://schemas.microsoft.com/office/drawing/2014/main" id="{904C2A26-561A-97AD-7F4D-D6A65F47890B}"/>
               </a:ext>
             </a:extLst>
           </p:cNvPr>
-          <p:cNvPicPr>
-            <a:picLocks noChangeAspect="1" noChangeArrowheads="1"/>
-          </p:cNvPicPr>
+          <p:cNvPicPr/>
           <p:nvPr/>
         </p:nvPicPr>
         <p:blipFill>
-          <a:blip r:embed="rId3">
-            <a:extLst>
-              <a:ext uri="{28A0092B-C50C-407E-A947-70E740481C1C}">
-                <a14:useLocalDpi xmlns:a14="http://schemas.microsoft.com/office/drawing/2010/main" val="0"/>
-              </a:ext>
-            </a:extLst>
-          </a:blip>
-          <a:srcRect/>
+          <a:blip r:embed="rId3"/>
           <a:stretch>
             <a:fillRect/>
           </a:stretch>
         </p:blipFill>
-        <p:spPr bwMode="auto">
+        <p:spPr>
           <a:xfrm>
-            <a:off x="8705725" y="-2"/>
-            <a:ext cx="4095874" cy="2250000"/>
+            <a:off x="-9" y="1976823"/>
+            <a:ext cx="12801609" cy="17222400"/>
           </a:xfrm>
           <a:prstGeom prst="rect">
             <a:avLst/>
           </a:prstGeom>
-          <a:noFill/>
-          <a:extLst>
-            <a:ext uri="{909E8E84-426E-40DD-AFC4-6F175D3DCCD1}">
-              <a14:hiddenFill xmlns:a14="http://schemas.microsoft.com/office/drawing/2010/main">
-                <a:solidFill>
-                  <a:srgbClr val="FFFFFF"/>
-                </a:solidFill>
-              </a14:hiddenFill>
-            </a:ext>
-          </a:extLst>
         </p:spPr>
       </p:pic>
       <p:sp>
@@ -3253,8 +3290,8 @@
         </p:nvSpPr>
         <p:spPr>
           <a:xfrm>
-            <a:off x="-2" y="3850714"/>
-            <a:ext cx="12801599" cy="1800000"/>
+            <a:off x="1" y="2270241"/>
+            <a:ext cx="12801599" cy="1260000"/>
           </a:xfrm>
         </p:spPr>
         <p:txBody>
@@ -3288,12 +3325,14 @@
         </p:nvSpPr>
         <p:spPr>
           <a:xfrm>
-            <a:off x="0" y="5650715"/>
-            <a:ext cx="12801600" cy="900000"/>
+            <a:off x="0" y="1694241"/>
+            <a:ext cx="12801600" cy="576000"/>
           </a:xfrm>
         </p:spPr>
         <p:txBody>
-          <a:bodyPr/>
+          <a:bodyPr>
+            <a:normAutofit/>
+          </a:bodyPr>
           <a:lstStyle/>
           <a:p>
             <a:r>
@@ -3310,10 +3349,10 @@
       </p:sp>
       <p:pic>
         <p:nvPicPr>
-          <p:cNvPr id="6" name="Afbeelding 5" descr="Afbeelding met rood, speelgoed, Auto-onderdeel, wiel&#10;&#10;Door AI gegenereerde inhoud is mogelijk onjuist.">
+          <p:cNvPr id="8" name="Afbeelding 7" descr="Afbeelding met Graphics, grafische vormgeving, Lettertype, logo&#10;&#10;Door AI gegenereerde inhoud is mogelijk onjuist.">
             <a:extLst>
               <a:ext uri="{FF2B5EF4-FFF2-40B4-BE49-F238E27FC236}">
-                <a16:creationId xmlns:a16="http://schemas.microsoft.com/office/drawing/2014/main" id="{D3FEB3F1-85F8-AA83-2BB4-4BB0182F706B}"/>
+                <a16:creationId xmlns:a16="http://schemas.microsoft.com/office/drawing/2014/main" id="{C8413D58-BBC2-7428-4F98-0ABF47340AE4}"/>
               </a:ext>
             </a:extLst>
           </p:cNvPr>
@@ -3336,8 +3375,80 @@
         </p:blipFill>
         <p:spPr>
           <a:xfrm>
-            <a:off x="0" y="6550715"/>
-            <a:ext cx="12673858" cy="12648510"/>
+            <a:off x="8705726" y="-542"/>
+            <a:ext cx="4095874" cy="2250000"/>
+          </a:xfrm>
+          <a:prstGeom prst="rect">
+            <a:avLst/>
+          </a:prstGeom>
+        </p:spPr>
+      </p:pic>
+      <p:pic>
+        <p:nvPicPr>
+          <p:cNvPr id="15" name="Afbeelding 14" descr="Afbeelding met tekst, schermopname, Rechthoek, Lettertype&#10;&#10;Door AI gegenereerde inhoud is mogelijk onjuist.">
+            <a:extLst>
+              <a:ext uri="{FF2B5EF4-FFF2-40B4-BE49-F238E27FC236}">
+                <a16:creationId xmlns:a16="http://schemas.microsoft.com/office/drawing/2014/main" id="{71A4EB95-01AF-86B9-1C79-11BA5AFE9489}"/>
+              </a:ext>
+            </a:extLst>
+          </p:cNvPr>
+          <p:cNvPicPr>
+            <a:picLocks noChangeAspect="1"/>
+          </p:cNvPicPr>
+          <p:nvPr/>
+        </p:nvPicPr>
+        <p:blipFill>
+          <a:blip r:embed="rId5">
+            <a:extLst>
+              <a:ext uri="{28A0092B-C50C-407E-A947-70E740481C1C}">
+                <a14:useLocalDpi xmlns:a14="http://schemas.microsoft.com/office/drawing/2010/main" val="0"/>
+              </a:ext>
+            </a:extLst>
+          </a:blip>
+          <a:stretch>
+            <a:fillRect/>
+          </a:stretch>
+        </p:blipFill>
+        <p:spPr>
+          <a:xfrm>
+            <a:off x="10327893" y="3530241"/>
+            <a:ext cx="2473701" cy="3443504"/>
+          </a:xfrm>
+          <a:prstGeom prst="rect">
+            <a:avLst/>
+          </a:prstGeom>
+        </p:spPr>
+      </p:pic>
+      <p:pic>
+        <p:nvPicPr>
+          <p:cNvPr id="17" name="Afbeelding 16" descr="Afbeelding met cirkel, Graphics, zwart, schermopname&#10;&#10;Door AI gegenereerde inhoud is mogelijk onjuist.">
+            <a:extLst>
+              <a:ext uri="{FF2B5EF4-FFF2-40B4-BE49-F238E27FC236}">
+                <a16:creationId xmlns:a16="http://schemas.microsoft.com/office/drawing/2014/main" id="{97E0183B-8CC1-F6D8-C7D5-DCCD35E9387B}"/>
+              </a:ext>
+            </a:extLst>
+          </p:cNvPr>
+          <p:cNvPicPr>
+            <a:picLocks noChangeAspect="1"/>
+          </p:cNvPicPr>
+          <p:nvPr/>
+        </p:nvPicPr>
+        <p:blipFill>
+          <a:blip r:embed="rId6">
+            <a:extLst>
+              <a:ext uri="{28A0092B-C50C-407E-A947-70E740481C1C}">
+                <a14:useLocalDpi xmlns:a14="http://schemas.microsoft.com/office/drawing/2010/main" val="0"/>
+              </a:ext>
+            </a:extLst>
+          </a:blip>
+          <a:stretch>
+            <a:fillRect/>
+          </a:stretch>
+        </p:blipFill>
+        <p:spPr>
+          <a:xfrm>
+            <a:off x="9287786" y="3524768"/>
+            <a:ext cx="1040104" cy="1057634"/>
           </a:xfrm>
           <a:prstGeom prst="rect">
             <a:avLst/>

</xml_diff>